<commit_message>
modified the test.py and introduction.png to match the new experiment length
</commit_message>
<xml_diff>
--- a/Pictures/introduction.pptx
+++ b/Pictures/introduction.pptx
@@ -197,7 +197,7 @@
           <a:p>
             <a:fld id="{C0546B5F-B17E-4A11-A9CD-A10C644EC78D}" type="datetimeFigureOut">
               <a:rPr lang="zh-CN" altLang="en-US" smtClean="0"/>
-              <a:t>2018/12/28</a:t>
+              <a:t>2019/1/4</a:t>
             </a:fld>
             <a:endParaRPr lang="zh-CN" altLang="en-US"/>
           </a:p>
@@ -695,7 +695,7 @@
           <a:p>
             <a:fld id="{22C6D5CB-9E91-4D8B-8A6F-E7E64CE5E759}" type="datetimeFigureOut">
               <a:rPr lang="zh-CN" altLang="en-US" smtClean="0"/>
-              <a:t>2018/12/28</a:t>
+              <a:t>2019/1/4</a:t>
             </a:fld>
             <a:endParaRPr lang="zh-CN" altLang="en-US"/>
           </a:p>
@@ -893,7 +893,7 @@
           <a:p>
             <a:fld id="{22C6D5CB-9E91-4D8B-8A6F-E7E64CE5E759}" type="datetimeFigureOut">
               <a:rPr lang="zh-CN" altLang="en-US" smtClean="0"/>
-              <a:t>2018/12/28</a:t>
+              <a:t>2019/1/4</a:t>
             </a:fld>
             <a:endParaRPr lang="zh-CN" altLang="en-US"/>
           </a:p>
@@ -1101,7 +1101,7 @@
           <a:p>
             <a:fld id="{22C6D5CB-9E91-4D8B-8A6F-E7E64CE5E759}" type="datetimeFigureOut">
               <a:rPr lang="zh-CN" altLang="en-US" smtClean="0"/>
-              <a:t>2018/12/28</a:t>
+              <a:t>2019/1/4</a:t>
             </a:fld>
             <a:endParaRPr lang="zh-CN" altLang="en-US"/>
           </a:p>
@@ -1299,7 +1299,7 @@
           <a:p>
             <a:fld id="{22C6D5CB-9E91-4D8B-8A6F-E7E64CE5E759}" type="datetimeFigureOut">
               <a:rPr lang="zh-CN" altLang="en-US" smtClean="0"/>
-              <a:t>2018/12/28</a:t>
+              <a:t>2019/1/4</a:t>
             </a:fld>
             <a:endParaRPr lang="zh-CN" altLang="en-US"/>
           </a:p>
@@ -1574,7 +1574,7 @@
           <a:p>
             <a:fld id="{22C6D5CB-9E91-4D8B-8A6F-E7E64CE5E759}" type="datetimeFigureOut">
               <a:rPr lang="zh-CN" altLang="en-US" smtClean="0"/>
-              <a:t>2018/12/28</a:t>
+              <a:t>2019/1/4</a:t>
             </a:fld>
             <a:endParaRPr lang="zh-CN" altLang="en-US"/>
           </a:p>
@@ -1839,7 +1839,7 @@
           <a:p>
             <a:fld id="{22C6D5CB-9E91-4D8B-8A6F-E7E64CE5E759}" type="datetimeFigureOut">
               <a:rPr lang="zh-CN" altLang="en-US" smtClean="0"/>
-              <a:t>2018/12/28</a:t>
+              <a:t>2019/1/4</a:t>
             </a:fld>
             <a:endParaRPr lang="zh-CN" altLang="en-US"/>
           </a:p>
@@ -2251,7 +2251,7 @@
           <a:p>
             <a:fld id="{22C6D5CB-9E91-4D8B-8A6F-E7E64CE5E759}" type="datetimeFigureOut">
               <a:rPr lang="zh-CN" altLang="en-US" smtClean="0"/>
-              <a:t>2018/12/28</a:t>
+              <a:t>2019/1/4</a:t>
             </a:fld>
             <a:endParaRPr lang="zh-CN" altLang="en-US"/>
           </a:p>
@@ -2392,7 +2392,7 @@
           <a:p>
             <a:fld id="{22C6D5CB-9E91-4D8B-8A6F-E7E64CE5E759}" type="datetimeFigureOut">
               <a:rPr lang="zh-CN" altLang="en-US" smtClean="0"/>
-              <a:t>2018/12/28</a:t>
+              <a:t>2019/1/4</a:t>
             </a:fld>
             <a:endParaRPr lang="zh-CN" altLang="en-US"/>
           </a:p>
@@ -2505,7 +2505,7 @@
           <a:p>
             <a:fld id="{22C6D5CB-9E91-4D8B-8A6F-E7E64CE5E759}" type="datetimeFigureOut">
               <a:rPr lang="zh-CN" altLang="en-US" smtClean="0"/>
-              <a:t>2018/12/28</a:t>
+              <a:t>2019/1/4</a:t>
             </a:fld>
             <a:endParaRPr lang="zh-CN" altLang="en-US"/>
           </a:p>
@@ -2816,7 +2816,7 @@
           <a:p>
             <a:fld id="{22C6D5CB-9E91-4D8B-8A6F-E7E64CE5E759}" type="datetimeFigureOut">
               <a:rPr lang="zh-CN" altLang="en-US" smtClean="0"/>
-              <a:t>2018/12/28</a:t>
+              <a:t>2019/1/4</a:t>
             </a:fld>
             <a:endParaRPr lang="zh-CN" altLang="en-US"/>
           </a:p>
@@ -3104,7 +3104,7 @@
           <a:p>
             <a:fld id="{22C6D5CB-9E91-4D8B-8A6F-E7E64CE5E759}" type="datetimeFigureOut">
               <a:rPr lang="zh-CN" altLang="en-US" smtClean="0"/>
-              <a:t>2018/12/28</a:t>
+              <a:t>2019/1/4</a:t>
             </a:fld>
             <a:endParaRPr lang="zh-CN" altLang="en-US"/>
           </a:p>
@@ -3345,7 +3345,7 @@
           <a:p>
             <a:fld id="{22C6D5CB-9E91-4D8B-8A6F-E7E64CE5E759}" type="datetimeFigureOut">
               <a:rPr lang="zh-CN" altLang="en-US" smtClean="0"/>
-              <a:t>2018/12/28</a:t>
+              <a:t>2019/1/4</a:t>
             </a:fld>
             <a:endParaRPr lang="zh-CN" altLang="en-US"/>
           </a:p>
@@ -3939,7 +3939,7 @@
                   <a:latin typeface="楷体" panose="02010609060101010101" pitchFamily="49" charset="-122"/>
                   <a:ea typeface="楷体" panose="02010609060101010101" pitchFamily="49" charset="-122"/>
                 </a:rPr>
-                <a:t>您好，欢迎参加吃豆人实验。实验共进行四次，每次时长均固定为</a:t>
+                <a:t>您好，欢迎参加吃豆人实验。实验共进行六次，每次时长均固定为</a:t>
               </a:r>
               <a:r>
                 <a:rPr lang="en-US" altLang="zh-CN" sz="1600" b="1" dirty="0">
@@ -3949,7 +3949,7 @@
                   <a:latin typeface="楷体" panose="02010609060101010101" pitchFamily="49" charset="-122"/>
                   <a:ea typeface="楷体" panose="02010609060101010101" pitchFamily="49" charset="-122"/>
                 </a:rPr>
-                <a:t>90</a:t>
+                <a:t>120</a:t>
               </a:r>
               <a:r>
                 <a:rPr lang="zh-CN" altLang="en-US" sz="1600" b="1" dirty="0">

</xml_diff>